<commit_message>
second iteration of compile
</commit_message>
<xml_diff>
--- a/Project 3 Planning.pptx
+++ b/Project 3 Planning.pptx
@@ -16,6 +16,7 @@
     <p:sldId id="257" r:id="rId10"/>
     <p:sldId id="258" r:id="rId11"/>
     <p:sldId id="259" r:id="rId12"/>
+    <p:sldId id="268" r:id="rId13"/>
   </p:sldIdLst>
   <p:sldSz cx="12192000" cy="6858000"/>
   <p:notesSz cx="6858000" cy="9144000"/>
@@ -127,12 +128,12 @@
   <pc:docChgLst>
     <pc:chgData name="Arsam I" userId="945c4322417bfb0e" providerId="LiveId" clId="{8FF6EC96-4F45-4E1B-BDFB-D19C2DA89A83}"/>
     <pc:docChg chg="undo custSel addSld delSld modSld sldOrd">
-      <pc:chgData name="Arsam I" userId="945c4322417bfb0e" providerId="LiveId" clId="{8FF6EC96-4F45-4E1B-BDFB-D19C2DA89A83}" dt="2023-04-14T00:40:21.006" v="1808" actId="20577"/>
+      <pc:chgData name="Arsam I" userId="945c4322417bfb0e" providerId="LiveId" clId="{8FF6EC96-4F45-4E1B-BDFB-D19C2DA89A83}" dt="2023-04-21T06:21:53.541" v="2269" actId="20577"/>
       <pc:docMkLst>
         <pc:docMk/>
       </pc:docMkLst>
       <pc:sldChg chg="addSp delSp modSp mod">
-        <pc:chgData name="Arsam I" userId="945c4322417bfb0e" providerId="LiveId" clId="{8FF6EC96-4F45-4E1B-BDFB-D19C2DA89A83}" dt="2023-04-14T00:40:21.006" v="1808" actId="20577"/>
+        <pc:chgData name="Arsam I" userId="945c4322417bfb0e" providerId="LiveId" clId="{8FF6EC96-4F45-4E1B-BDFB-D19C2DA89A83}" dt="2023-04-18T23:28:35.485" v="1822" actId="1037"/>
         <pc:sldMkLst>
           <pc:docMk/>
           <pc:sldMk cId="2754122037" sldId="256"/>
@@ -201,6 +202,14 @@
             <ac:spMk id="9" creationId="{6FBCDDF7-79C2-777A-3244-CA793CA4B65F}"/>
           </ac:spMkLst>
         </pc:spChg>
+        <pc:spChg chg="add mod">
+          <ac:chgData name="Arsam I" userId="945c4322417bfb0e" providerId="LiveId" clId="{8FF6EC96-4F45-4E1B-BDFB-D19C2DA89A83}" dt="2023-04-18T23:28:35.485" v="1822" actId="1037"/>
+          <ac:spMkLst>
+            <pc:docMk/>
+            <pc:sldMk cId="2754122037" sldId="256"/>
+            <ac:spMk id="10" creationId="{B1F3DE4C-1769-48CB-57EC-7BEA89727B6C}"/>
+          </ac:spMkLst>
+        </pc:spChg>
         <pc:spChg chg="mod">
           <ac:chgData name="Arsam I" userId="945c4322417bfb0e" providerId="LiveId" clId="{8FF6EC96-4F45-4E1B-BDFB-D19C2DA89A83}" dt="2023-04-12T01:15:25.083" v="252" actId="1076"/>
           <ac:spMkLst>
@@ -249,6 +258,29 @@
             <ac:spMk id="52" creationId="{BBC0F6C8-FB1A-0F61-0102-BF35700A77A2}"/>
           </ac:spMkLst>
         </pc:spChg>
+      </pc:sldChg>
+      <pc:sldChg chg="addSp modSp mod">
+        <pc:chgData name="Arsam I" userId="945c4322417bfb0e" providerId="LiveId" clId="{8FF6EC96-4F45-4E1B-BDFB-D19C2DA89A83}" dt="2023-04-20T23:28:53.182" v="1885" actId="1076"/>
+        <pc:sldMkLst>
+          <pc:docMk/>
+          <pc:sldMk cId="3953669307" sldId="257"/>
+        </pc:sldMkLst>
+        <pc:picChg chg="add mod">
+          <ac:chgData name="Arsam I" userId="945c4322417bfb0e" providerId="LiveId" clId="{8FF6EC96-4F45-4E1B-BDFB-D19C2DA89A83}" dt="2023-04-20T23:28:40.157" v="1883" actId="1076"/>
+          <ac:picMkLst>
+            <pc:docMk/>
+            <pc:sldMk cId="3953669307" sldId="257"/>
+            <ac:picMk id="3" creationId="{A6D18A3D-9441-5829-6343-C3A1A347CC52}"/>
+          </ac:picMkLst>
+        </pc:picChg>
+        <pc:picChg chg="add mod">
+          <ac:chgData name="Arsam I" userId="945c4322417bfb0e" providerId="LiveId" clId="{8FF6EC96-4F45-4E1B-BDFB-D19C2DA89A83}" dt="2023-04-20T23:28:53.182" v="1885" actId="1076"/>
+          <ac:picMkLst>
+            <pc:docMk/>
+            <pc:sldMk cId="3953669307" sldId="257"/>
+            <ac:picMk id="7" creationId="{28D3BE7B-F5FA-A849-3CEF-B95CEBAE8988}"/>
+          </ac:picMkLst>
+        </pc:picChg>
       </pc:sldChg>
       <pc:sldChg chg="modSp mod">
         <pc:chgData name="Arsam I" userId="945c4322417bfb0e" providerId="LiveId" clId="{8FF6EC96-4F45-4E1B-BDFB-D19C2DA89A83}" dt="2023-04-12T01:08:40.230" v="184" actId="115"/>
@@ -1017,6 +1049,37 @@
           </ac:spMkLst>
         </pc:spChg>
       </pc:sldChg>
+      <pc:sldChg chg="addSp delSp modSp new mod">
+        <pc:chgData name="Arsam I" userId="945c4322417bfb0e" providerId="LiveId" clId="{8FF6EC96-4F45-4E1B-BDFB-D19C2DA89A83}" dt="2023-04-21T06:21:53.541" v="2269" actId="20577"/>
+        <pc:sldMkLst>
+          <pc:docMk/>
+          <pc:sldMk cId="967643306" sldId="268"/>
+        </pc:sldMkLst>
+        <pc:spChg chg="del">
+          <ac:chgData name="Arsam I" userId="945c4322417bfb0e" providerId="LiveId" clId="{8FF6EC96-4F45-4E1B-BDFB-D19C2DA89A83}" dt="2023-04-20T22:54:51.768" v="1824" actId="478"/>
+          <ac:spMkLst>
+            <pc:docMk/>
+            <pc:sldMk cId="967643306" sldId="268"/>
+            <ac:spMk id="2" creationId="{E7309E76-B032-52D4-5CB7-EE118122E253}"/>
+          </ac:spMkLst>
+        </pc:spChg>
+        <pc:spChg chg="del">
+          <ac:chgData name="Arsam I" userId="945c4322417bfb0e" providerId="LiveId" clId="{8FF6EC96-4F45-4E1B-BDFB-D19C2DA89A83}" dt="2023-04-20T22:54:53.244" v="1825" actId="478"/>
+          <ac:spMkLst>
+            <pc:docMk/>
+            <pc:sldMk cId="967643306" sldId="268"/>
+            <ac:spMk id="3" creationId="{9BEEF5A9-1353-06AB-CDC9-6A6724C69363}"/>
+          </ac:spMkLst>
+        </pc:spChg>
+        <pc:spChg chg="add mod">
+          <ac:chgData name="Arsam I" userId="945c4322417bfb0e" providerId="LiveId" clId="{8FF6EC96-4F45-4E1B-BDFB-D19C2DA89A83}" dt="2023-04-21T06:21:53.541" v="2269" actId="20577"/>
+          <ac:spMkLst>
+            <pc:docMk/>
+            <pc:sldMk cId="967643306" sldId="268"/>
+            <ac:spMk id="4" creationId="{AF285E15-5412-9A42-0C96-CECC06B88564}"/>
+          </ac:spMkLst>
+        </pc:spChg>
+      </pc:sldChg>
     </pc:docChg>
   </pc:docChgLst>
 </pc:chgInfo>
@@ -1171,7 +1234,7 @@
           <a:p>
             <a:fld id="{FEF4F03A-4C2E-4909-A77F-52D07D1F9F21}" type="datetimeFigureOut">
               <a:rPr lang="en-CA" smtClean="0"/>
-              <a:t>2023-04-13</a:t>
+              <a:t>2023-04-20</a:t>
             </a:fld>
             <a:endParaRPr lang="en-CA"/>
           </a:p>
@@ -1371,7 +1434,7 @@
           <a:p>
             <a:fld id="{FEF4F03A-4C2E-4909-A77F-52D07D1F9F21}" type="datetimeFigureOut">
               <a:rPr lang="en-CA" smtClean="0"/>
-              <a:t>2023-04-13</a:t>
+              <a:t>2023-04-20</a:t>
             </a:fld>
             <a:endParaRPr lang="en-CA"/>
           </a:p>
@@ -1581,7 +1644,7 @@
           <a:p>
             <a:fld id="{FEF4F03A-4C2E-4909-A77F-52D07D1F9F21}" type="datetimeFigureOut">
               <a:rPr lang="en-CA" smtClean="0"/>
-              <a:t>2023-04-13</a:t>
+              <a:t>2023-04-20</a:t>
             </a:fld>
             <a:endParaRPr lang="en-CA"/>
           </a:p>
@@ -1781,7 +1844,7 @@
           <a:p>
             <a:fld id="{FEF4F03A-4C2E-4909-A77F-52D07D1F9F21}" type="datetimeFigureOut">
               <a:rPr lang="en-CA" smtClean="0"/>
-              <a:t>2023-04-13</a:t>
+              <a:t>2023-04-20</a:t>
             </a:fld>
             <a:endParaRPr lang="en-CA"/>
           </a:p>
@@ -2057,7 +2120,7 @@
           <a:p>
             <a:fld id="{FEF4F03A-4C2E-4909-A77F-52D07D1F9F21}" type="datetimeFigureOut">
               <a:rPr lang="en-CA" smtClean="0"/>
-              <a:t>2023-04-13</a:t>
+              <a:t>2023-04-20</a:t>
             </a:fld>
             <a:endParaRPr lang="en-CA"/>
           </a:p>
@@ -2325,7 +2388,7 @@
           <a:p>
             <a:fld id="{FEF4F03A-4C2E-4909-A77F-52D07D1F9F21}" type="datetimeFigureOut">
               <a:rPr lang="en-CA" smtClean="0"/>
-              <a:t>2023-04-13</a:t>
+              <a:t>2023-04-20</a:t>
             </a:fld>
             <a:endParaRPr lang="en-CA"/>
           </a:p>
@@ -2740,7 +2803,7 @@
           <a:p>
             <a:fld id="{FEF4F03A-4C2E-4909-A77F-52D07D1F9F21}" type="datetimeFigureOut">
               <a:rPr lang="en-CA" smtClean="0"/>
-              <a:t>2023-04-13</a:t>
+              <a:t>2023-04-20</a:t>
             </a:fld>
             <a:endParaRPr lang="en-CA"/>
           </a:p>
@@ -2882,7 +2945,7 @@
           <a:p>
             <a:fld id="{FEF4F03A-4C2E-4909-A77F-52D07D1F9F21}" type="datetimeFigureOut">
               <a:rPr lang="en-CA" smtClean="0"/>
-              <a:t>2023-04-13</a:t>
+              <a:t>2023-04-20</a:t>
             </a:fld>
             <a:endParaRPr lang="en-CA"/>
           </a:p>
@@ -2995,7 +3058,7 @@
           <a:p>
             <a:fld id="{FEF4F03A-4C2E-4909-A77F-52D07D1F9F21}" type="datetimeFigureOut">
               <a:rPr lang="en-CA" smtClean="0"/>
-              <a:t>2023-04-13</a:t>
+              <a:t>2023-04-20</a:t>
             </a:fld>
             <a:endParaRPr lang="en-CA"/>
           </a:p>
@@ -3308,7 +3371,7 @@
           <a:p>
             <a:fld id="{FEF4F03A-4C2E-4909-A77F-52D07D1F9F21}" type="datetimeFigureOut">
               <a:rPr lang="en-CA" smtClean="0"/>
-              <a:t>2023-04-13</a:t>
+              <a:t>2023-04-20</a:t>
             </a:fld>
             <a:endParaRPr lang="en-CA"/>
           </a:p>
@@ -3597,7 +3660,7 @@
           <a:p>
             <a:fld id="{FEF4F03A-4C2E-4909-A77F-52D07D1F9F21}" type="datetimeFigureOut">
               <a:rPr lang="en-CA" smtClean="0"/>
-              <a:t>2023-04-13</a:t>
+              <a:t>2023-04-20</a:t>
             </a:fld>
             <a:endParaRPr lang="en-CA"/>
           </a:p>
@@ -3840,7 +3903,7 @@
           <a:p>
             <a:fld id="{FEF4F03A-4C2E-4909-A77F-52D07D1F9F21}" type="datetimeFigureOut">
               <a:rPr lang="en-CA" smtClean="0"/>
-              <a:t>2023-04-13</a:t>
+              <a:t>2023-04-20</a:t>
             </a:fld>
             <a:endParaRPr lang="en-CA"/>
           </a:p>
@@ -6294,6 +6357,56 @@
           </a:p>
         </p:txBody>
       </p:sp>
+      <p:sp>
+        <p:nvSpPr>
+          <p:cNvPr id="10" name="Rectangle: Rounded Corners 9">
+            <a:extLst>
+              <a:ext uri="{FF2B5EF4-FFF2-40B4-BE49-F238E27FC236}">
+                <a16:creationId xmlns:a16="http://schemas.microsoft.com/office/drawing/2014/main" id="{B1F3DE4C-1769-48CB-57EC-7BEA89727B6C}"/>
+              </a:ext>
+            </a:extLst>
+          </p:cNvPr>
+          <p:cNvSpPr/>
+          <p:nvPr/>
+        </p:nvSpPr>
+        <p:spPr>
+          <a:xfrm>
+            <a:off x="6856426" y="1538943"/>
+            <a:ext cx="726349" cy="329268"/>
+          </a:xfrm>
+          <a:prstGeom prst="roundRect">
+            <a:avLst/>
+          </a:prstGeom>
+        </p:spPr>
+        <p:style>
+          <a:lnRef idx="2">
+            <a:schemeClr val="accent1">
+              <a:shade val="50000"/>
+            </a:schemeClr>
+          </a:lnRef>
+          <a:fillRef idx="1">
+            <a:schemeClr val="accent1"/>
+          </a:fillRef>
+          <a:effectRef idx="0">
+            <a:schemeClr val="accent1"/>
+          </a:effectRef>
+          <a:fontRef idx="minor">
+            <a:schemeClr val="lt1"/>
+          </a:fontRef>
+        </p:style>
+        <p:txBody>
+          <a:bodyPr rtlCol="0" anchor="ctr"/>
+          <a:lstStyle/>
+          <a:p>
+            <a:pPr algn="ctr"/>
+            <a:r>
+              <a:rPr lang="en-US" sz="700" dirty="0"/>
+              <a:t>Front End</a:t>
+            </a:r>
+            <a:endParaRPr lang="en-CA" sz="700" dirty="0"/>
+          </a:p>
+        </p:txBody>
+      </p:sp>
     </p:spTree>
     <p:extLst>
       <p:ext uri="{BB962C8B-B14F-4D97-AF65-F5344CB8AC3E}">
@@ -6736,6 +6849,212 @@
     <p:extLst>
       <p:ext uri="{BB962C8B-B14F-4D97-AF65-F5344CB8AC3E}">
         <p14:creationId xmlns:p14="http://schemas.microsoft.com/office/powerpoint/2010/main" val="4240041981"/>
+      </p:ext>
+    </p:extLst>
+  </p:cSld>
+  <p:clrMapOvr>
+    <a:masterClrMapping/>
+  </p:clrMapOvr>
+</p:sld>
+</file>
+
+<file path=ppt/slides/slide12.xml><?xml version="1.0" encoding="utf-8"?>
+<p:sld xmlns:a="http://schemas.openxmlformats.org/drawingml/2006/main" xmlns:r="http://schemas.openxmlformats.org/officeDocument/2006/relationships" xmlns:p="http://schemas.openxmlformats.org/presentationml/2006/main">
+  <p:cSld>
+    <p:spTree>
+      <p:nvGrpSpPr>
+        <p:cNvPr id="1" name=""/>
+        <p:cNvGrpSpPr/>
+        <p:nvPr/>
+      </p:nvGrpSpPr>
+      <p:grpSpPr>
+        <a:xfrm>
+          <a:off x="0" y="0"/>
+          <a:ext cx="0" cy="0"/>
+          <a:chOff x="0" y="0"/>
+          <a:chExt cx="0" cy="0"/>
+        </a:xfrm>
+      </p:grpSpPr>
+      <p:sp>
+        <p:nvSpPr>
+          <p:cNvPr id="4" name="TextBox 3">
+            <a:extLst>
+              <a:ext uri="{FF2B5EF4-FFF2-40B4-BE49-F238E27FC236}">
+                <a16:creationId xmlns:a16="http://schemas.microsoft.com/office/drawing/2014/main" id="{AF285E15-5412-9A42-0C96-CECC06B88564}"/>
+              </a:ext>
+            </a:extLst>
+          </p:cNvPr>
+          <p:cNvSpPr txBox="1"/>
+          <p:nvPr/>
+        </p:nvSpPr>
+        <p:spPr>
+          <a:xfrm>
+            <a:off x="436228" y="159391"/>
+            <a:ext cx="11392249" cy="5355312"/>
+          </a:xfrm>
+          <a:prstGeom prst="rect">
+            <a:avLst/>
+          </a:prstGeom>
+          <a:noFill/>
+        </p:spPr>
+        <p:txBody>
+          <a:bodyPr wrap="square" rtlCol="0">
+            <a:spAutoFit/>
+          </a:bodyPr>
+          <a:lstStyle/>
+          <a:p>
+            <a:r>
+              <a:rPr lang="en-US" dirty="0"/>
+              <a:t>To do list:</a:t>
+            </a:r>
+          </a:p>
+          <a:p>
+            <a:r>
+              <a:rPr lang="en-US" dirty="0"/>
+              <a:t>Main Page:</a:t>
+            </a:r>
+          </a:p>
+          <a:p>
+            <a:pPr marL="342900" indent="-342900">
+              <a:buAutoNum type="arabicPeriod"/>
+            </a:pPr>
+            <a:r>
+              <a:rPr lang="en-US" dirty="0"/>
+              <a:t>Replace tags</a:t>
+            </a:r>
+          </a:p>
+          <a:p>
+            <a:pPr marL="342900" indent="-342900">
+              <a:buAutoNum type="arabicPeriod"/>
+            </a:pPr>
+            <a:r>
+              <a:rPr lang="en-US" dirty="0"/>
+              <a:t>Improv title, and add group information</a:t>
+            </a:r>
+          </a:p>
+          <a:p>
+            <a:pPr marL="342900" indent="-342900">
+              <a:buAutoNum type="arabicPeriod"/>
+            </a:pPr>
+            <a:r>
+              <a:rPr lang="en-US" dirty="0"/>
+              <a:t>Create links to all other tags</a:t>
+            </a:r>
+          </a:p>
+          <a:p>
+            <a:endParaRPr lang="en-US" dirty="0"/>
+          </a:p>
+          <a:p>
+            <a:r>
+              <a:rPr lang="en-US" dirty="0"/>
+              <a:t>4. Save and link other group files</a:t>
+            </a:r>
+          </a:p>
+          <a:p>
+            <a:endParaRPr lang="en-US" dirty="0"/>
+          </a:p>
+          <a:p>
+            <a:r>
+              <a:rPr lang="en-US" dirty="0"/>
+              <a:t>5. Add backgrounds to graphs</a:t>
+            </a:r>
+          </a:p>
+          <a:p>
+            <a:endParaRPr lang="en-US" dirty="0"/>
+          </a:p>
+          <a:p>
+            <a:r>
+              <a:rPr lang="en-US" dirty="0"/>
+              <a:t>6. Slides (Friday)</a:t>
+            </a:r>
+          </a:p>
+          <a:p>
+            <a:endParaRPr lang="en-US" dirty="0"/>
+          </a:p>
+          <a:p>
+            <a:r>
+              <a:rPr lang="en-US" dirty="0"/>
+              <a:t>7. Add topo </a:t>
+            </a:r>
+            <a:r>
+              <a:rPr lang="en-US" dirty="0">
+                <a:solidFill>
+                  <a:srgbClr val="FF0000"/>
+                </a:solidFill>
+              </a:rPr>
+              <a:t>(CAN’T DO IT)</a:t>
+            </a:r>
+          </a:p>
+          <a:p>
+            <a:endParaRPr lang="en-US" dirty="0"/>
+          </a:p>
+          <a:p>
+            <a:r>
+              <a:rPr lang="en-US" dirty="0"/>
+              <a:t>8. Custom markers </a:t>
+            </a:r>
+            <a:r>
+              <a:rPr lang="en-US" dirty="0">
+                <a:solidFill>
+                  <a:srgbClr val="00B050"/>
+                </a:solidFill>
+              </a:rPr>
+              <a:t>(DONE. Only on the </a:t>
+            </a:r>
+            <a:r>
+              <a:rPr lang="en-US" dirty="0" err="1">
+                <a:solidFill>
+                  <a:srgbClr val="00B050"/>
+                </a:solidFill>
+              </a:rPr>
+              <a:t>denny</a:t>
+            </a:r>
+            <a:r>
+              <a:rPr lang="en-US" dirty="0">
+                <a:solidFill>
+                  <a:srgbClr val="00B050"/>
+                </a:solidFill>
+              </a:rPr>
+              <a:t> file, need to transfer over </a:t>
+            </a:r>
+            <a:r>
+              <a:rPr lang="en-US">
+                <a:solidFill>
+                  <a:srgbClr val="00B050"/>
+                </a:solidFill>
+              </a:rPr>
+              <a:t>to the main file)</a:t>
+            </a:r>
+            <a:endParaRPr lang="en-US" dirty="0">
+              <a:solidFill>
+                <a:srgbClr val="00B050"/>
+              </a:solidFill>
+            </a:endParaRPr>
+          </a:p>
+          <a:p>
+            <a:endParaRPr lang="en-US" dirty="0"/>
+          </a:p>
+          <a:p>
+            <a:r>
+              <a:rPr lang="en-US" dirty="0"/>
+              <a:t>9. Pull data from query</a:t>
+            </a:r>
+          </a:p>
+          <a:p>
+            <a:pPr marL="342900" indent="-342900">
+              <a:buAutoNum type="arabicPeriod"/>
+            </a:pPr>
+            <a:endParaRPr lang="en-US" dirty="0"/>
+          </a:p>
+          <a:p>
+            <a:endParaRPr lang="en-CA" dirty="0"/>
+          </a:p>
+        </p:txBody>
+      </p:sp>
+    </p:spTree>
+    <p:extLst>
+      <p:ext uri="{BB962C8B-B14F-4D97-AF65-F5344CB8AC3E}">
+        <p14:creationId xmlns:p14="http://schemas.microsoft.com/office/powerpoint/2010/main" val="967643306"/>
       </p:ext>
     </p:extLst>
   </p:cSld>
@@ -10875,6 +11194,66 @@
           </a:p>
         </p:txBody>
       </p:sp>
+      <p:pic>
+        <p:nvPicPr>
+          <p:cNvPr id="3" name="Picture 2">
+            <a:extLst>
+              <a:ext uri="{FF2B5EF4-FFF2-40B4-BE49-F238E27FC236}">
+                <a16:creationId xmlns:a16="http://schemas.microsoft.com/office/drawing/2014/main" id="{A6D18A3D-9441-5829-6343-C3A1A347CC52}"/>
+              </a:ext>
+            </a:extLst>
+          </p:cNvPr>
+          <p:cNvPicPr>
+            <a:picLocks noChangeAspect="1"/>
+          </p:cNvPicPr>
+          <p:nvPr/>
+        </p:nvPicPr>
+        <p:blipFill>
+          <a:blip r:embed="rId2"/>
+          <a:stretch>
+            <a:fillRect/>
+          </a:stretch>
+        </p:blipFill>
+        <p:spPr>
+          <a:xfrm>
+            <a:off x="152530" y="175688"/>
+            <a:ext cx="7172325" cy="3419475"/>
+          </a:xfrm>
+          <a:prstGeom prst="rect">
+            <a:avLst/>
+          </a:prstGeom>
+        </p:spPr>
+      </p:pic>
+      <p:pic>
+        <p:nvPicPr>
+          <p:cNvPr id="7" name="Picture 6">
+            <a:extLst>
+              <a:ext uri="{FF2B5EF4-FFF2-40B4-BE49-F238E27FC236}">
+                <a16:creationId xmlns:a16="http://schemas.microsoft.com/office/drawing/2014/main" id="{28D3BE7B-F5FA-A849-3CEF-B95CEBAE8988}"/>
+              </a:ext>
+            </a:extLst>
+          </p:cNvPr>
+          <p:cNvPicPr>
+            <a:picLocks noChangeAspect="1"/>
+          </p:cNvPicPr>
+          <p:nvPr/>
+        </p:nvPicPr>
+        <p:blipFill>
+          <a:blip r:embed="rId3"/>
+          <a:stretch>
+            <a:fillRect/>
+          </a:stretch>
+        </p:blipFill>
+        <p:spPr>
+          <a:xfrm>
+            <a:off x="1115691" y="895934"/>
+            <a:ext cx="7058025" cy="3209925"/>
+          </a:xfrm>
+          <a:prstGeom prst="rect">
+            <a:avLst/>
+          </a:prstGeom>
+        </p:spPr>
+      </p:pic>
     </p:spTree>
     <p:extLst>
       <p:ext uri="{BB962C8B-B14F-4D97-AF65-F5344CB8AC3E}">

</xml_diff>